<commit_message>
sorry just reading the file
</commit_message>
<xml_diff>
--- a/Results/Overview_results_22Fev17.pptx
+++ b/Results/Overview_results_22Fev17.pptx
@@ -15,9 +15,10 @@
     <p:sldId id="265" r:id="rId9"/>
     <p:sldId id="266" r:id="rId10"/>
     <p:sldId id="263" r:id="rId11"/>
-    <p:sldId id="260" r:id="rId12"/>
-    <p:sldId id="262" r:id="rId13"/>
-    <p:sldId id="268" r:id="rId14"/>
+    <p:sldId id="269" r:id="rId12"/>
+    <p:sldId id="260" r:id="rId13"/>
+    <p:sldId id="262" r:id="rId14"/>
+    <p:sldId id="268" r:id="rId15"/>
   </p:sldIdLst>
   <p:sldSz cx="9144000" cy="6858000" type="screen4x3"/>
   <p:notesSz cx="6858000" cy="9144000"/>
@@ -131,6 +132,7 @@
             <p14:sldId id="265"/>
             <p14:sldId id="266"/>
             <p14:sldId id="263"/>
+            <p14:sldId id="269"/>
             <p14:sldId id="260"/>
             <p14:sldId id="262"/>
             <p14:sldId id="268"/>
@@ -3225,7 +3227,7 @@
             </a:pPr>
             <a:r>
               <a:rPr lang="en-US" sz="2400" dirty="0" smtClean="0"/>
-              <a:t>Native abundances</a:t>
+              <a:t>Native abundances &amp; Cover!</a:t>
             </a:r>
           </a:p>
           <a:p>
@@ -3325,6 +3327,30 @@
           <a:chExt cx="0" cy="0"/>
         </a:xfrm>
       </p:grpSpPr>
+      <p:pic>
+        <p:nvPicPr>
+          <p:cNvPr id="10" name="Picture 9"/>
+          <p:cNvPicPr>
+            <a:picLocks noChangeAspect="1"/>
+          </p:cNvPicPr>
+          <p:nvPr/>
+        </p:nvPicPr>
+        <p:blipFill>
+          <a:blip r:embed="rId2"/>
+          <a:stretch>
+            <a:fillRect/>
+          </a:stretch>
+        </p:blipFill>
+        <p:spPr>
+          <a:xfrm>
+            <a:off x="809388" y="1591590"/>
+            <a:ext cx="8334609" cy="5266410"/>
+          </a:xfrm>
+          <a:prstGeom prst="rect">
+            <a:avLst/>
+          </a:prstGeom>
+        </p:spPr>
+      </p:pic>
       <p:sp>
         <p:nvSpPr>
           <p:cNvPr id="5" name="Rectangle 4"/>
@@ -3353,6 +3379,68 @@
           </a:p>
         </p:txBody>
       </p:sp>
+      <p:pic>
+        <p:nvPicPr>
+          <p:cNvPr id="9" name="Picture 8"/>
+          <p:cNvPicPr>
+            <a:picLocks noChangeAspect="1"/>
+          </p:cNvPicPr>
+          <p:nvPr/>
+        </p:nvPicPr>
+        <p:blipFill>
+          <a:blip r:embed="rId3"/>
+          <a:stretch>
+            <a:fillRect/>
+          </a:stretch>
+        </p:blipFill>
+        <p:spPr>
+          <a:xfrm>
+            <a:off x="6122661" y="0"/>
+            <a:ext cx="3021337" cy="2009773"/>
+          </a:xfrm>
+          <a:prstGeom prst="rect">
+            <a:avLst/>
+          </a:prstGeom>
+        </p:spPr>
+      </p:pic>
+      <p:sp>
+        <p:nvSpPr>
+          <p:cNvPr id="7" name="TextBox 6"/>
+          <p:cNvSpPr txBox="1"/>
+          <p:nvPr/>
+        </p:nvSpPr>
+        <p:spPr>
+          <a:xfrm>
+            <a:off x="348875" y="865319"/>
+            <a:ext cx="6015101" cy="369332"/>
+          </a:xfrm>
+          <a:prstGeom prst="rect">
+            <a:avLst/>
+          </a:prstGeom>
+          <a:noFill/>
+        </p:spPr>
+        <p:txBody>
+          <a:bodyPr wrap="none" rtlCol="0">
+            <a:spAutoFit/>
+          </a:bodyPr>
+          <a:lstStyle/>
+          <a:p>
+            <a:r>
+              <a:rPr lang="en-US" dirty="0" smtClean="0"/>
+              <a:t>Total species cover changes over time (p-</a:t>
+            </a:r>
+            <a:r>
+              <a:rPr lang="en-US" dirty="0" err="1" smtClean="0"/>
+              <a:t>val</a:t>
+            </a:r>
+            <a:r>
+              <a:rPr lang="en-US" dirty="0" smtClean="0"/>
+              <a:t>&lt;0.001; R2=0.13)</a:t>
+            </a:r>
+            <a:endParaRPr lang="en-US" dirty="0"/>
+          </a:p>
+        </p:txBody>
+      </p:sp>
     </p:spTree>
     <p:extLst>
       <p:ext uri="{BB962C8B-B14F-4D97-AF65-F5344CB8AC3E}">
@@ -3367,6 +3455,1510 @@
 </file>
 
 <file path=ppt/slides/slide11.xml><?xml version="1.0" encoding="utf-8"?>
+<p:sld xmlns:a="http://schemas.openxmlformats.org/drawingml/2006/main" xmlns:r="http://schemas.openxmlformats.org/officeDocument/2006/relationships" xmlns:p="http://schemas.openxmlformats.org/presentationml/2006/main">
+  <p:cSld>
+    <p:bg>
+      <p:bgPr>
+        <a:solidFill>
+          <a:schemeClr val="accent3">
+            <a:lumMod val="20000"/>
+            <a:lumOff val="80000"/>
+          </a:schemeClr>
+        </a:solidFill>
+        <a:effectLst/>
+      </p:bgPr>
+    </p:bg>
+    <p:spTree>
+      <p:nvGrpSpPr>
+        <p:cNvPr id="1" name=""/>
+        <p:cNvGrpSpPr/>
+        <p:nvPr/>
+      </p:nvGrpSpPr>
+      <p:grpSpPr>
+        <a:xfrm>
+          <a:off x="0" y="0"/>
+          <a:ext cx="0" cy="0"/>
+          <a:chOff x="0" y="0"/>
+          <a:chExt cx="0" cy="0"/>
+        </a:xfrm>
+      </p:grpSpPr>
+      <p:sp>
+        <p:nvSpPr>
+          <p:cNvPr id="5" name="Rectangle 4"/>
+          <p:cNvSpPr/>
+          <p:nvPr/>
+        </p:nvSpPr>
+        <p:spPr>
+          <a:xfrm>
+            <a:off x="153950" y="158072"/>
+            <a:ext cx="8990049" cy="461665"/>
+          </a:xfrm>
+          <a:prstGeom prst="rect">
+            <a:avLst/>
+          </a:prstGeom>
+        </p:spPr>
+        <p:txBody>
+          <a:bodyPr wrap="square">
+            <a:spAutoFit/>
+          </a:bodyPr>
+          <a:lstStyle/>
+          <a:p>
+            <a:r>
+              <a:rPr lang="en-US" sz="2400" b="1" dirty="0" smtClean="0"/>
+              <a:t>What impacts on Native species traits</a:t>
+            </a:r>
+          </a:p>
+        </p:txBody>
+      </p:sp>
+      <p:graphicFrame>
+        <p:nvGraphicFramePr>
+          <p:cNvPr id="6" name="Table 5"/>
+          <p:cNvGraphicFramePr>
+            <a:graphicFrameLocks noGrp="1"/>
+          </p:cNvGraphicFramePr>
+          <p:nvPr>
+            <p:extLst>
+              <p:ext uri="{D42A27DB-BD31-4B8C-83A1-F6EECF244321}">
+                <p14:modId xmlns:p14="http://schemas.microsoft.com/office/powerpoint/2010/main" val="3222897845"/>
+              </p:ext>
+            </p:extLst>
+          </p:nvPr>
+        </p:nvGraphicFramePr>
+        <p:xfrm>
+          <a:off x="1133260" y="2401886"/>
+          <a:ext cx="6096002" cy="3484879"/>
+        </p:xfrm>
+        <a:graphic>
+          <a:graphicData uri="http://schemas.openxmlformats.org/drawingml/2006/table">
+            <a:tbl>
+              <a:tblPr firstRow="1" bandRow="1">
+                <a:tableStyleId>{8799B23B-EC83-4686-B30A-512413B5E67A}</a:tableStyleId>
+              </a:tblPr>
+              <a:tblGrid>
+                <a:gridCol w="554182"/>
+                <a:gridCol w="554182"/>
+                <a:gridCol w="554182"/>
+                <a:gridCol w="554182"/>
+                <a:gridCol w="554182"/>
+                <a:gridCol w="554182"/>
+                <a:gridCol w="554182"/>
+                <a:gridCol w="554182"/>
+                <a:gridCol w="554182"/>
+                <a:gridCol w="554182"/>
+                <a:gridCol w="554182"/>
+              </a:tblGrid>
+              <a:tr h="370840">
+                <a:tc>
+                  <a:txBody>
+                    <a:bodyPr/>
+                    <a:lstStyle/>
+                    <a:p>
+                      <a:endParaRPr lang="en-US" sz="1400" dirty="0"/>
+                    </a:p>
+                  </a:txBody>
+                  <a:tcPr/>
+                </a:tc>
+                <a:tc>
+                  <a:txBody>
+                    <a:bodyPr/>
+                    <a:lstStyle/>
+                    <a:p>
+                      <a:r>
+                        <a:rPr lang="en-US" sz="1400" dirty="0" err="1" smtClean="0"/>
+                        <a:t>dTime</a:t>
+                      </a:r>
+                      <a:endParaRPr lang="en-US" sz="1400" dirty="0"/>
+                    </a:p>
+                  </a:txBody>
+                  <a:tcPr>
+                    <a:solidFill>
+                      <a:schemeClr val="accent5">
+                        <a:lumMod val="20000"/>
+                        <a:lumOff val="80000"/>
+                      </a:schemeClr>
+                    </a:solidFill>
+                  </a:tcPr>
+                </a:tc>
+                <a:tc>
+                  <a:txBody>
+                    <a:bodyPr/>
+                    <a:lstStyle/>
+                    <a:p>
+                      <a:r>
+                        <a:rPr lang="en-US" sz="1400" dirty="0" err="1" smtClean="0"/>
+                        <a:t>N_h</a:t>
+                      </a:r>
+                      <a:endParaRPr lang="en-US" sz="1400" dirty="0"/>
+                    </a:p>
+                  </a:txBody>
+                  <a:tcPr>
+                    <a:solidFill>
+                      <a:schemeClr val="accent3">
+                        <a:lumMod val="60000"/>
+                        <a:lumOff val="40000"/>
+                      </a:schemeClr>
+                    </a:solidFill>
+                  </a:tcPr>
+                </a:tc>
+                <a:tc>
+                  <a:txBody>
+                    <a:bodyPr/>
+                    <a:lstStyle/>
+                    <a:p>
+                      <a:r>
+                        <a:rPr lang="en-US" sz="1400" dirty="0" err="1" smtClean="0"/>
+                        <a:t>N_g</a:t>
+                      </a:r>
+                      <a:endParaRPr lang="en-US" sz="1400" dirty="0"/>
+                    </a:p>
+                  </a:txBody>
+                  <a:tcPr>
+                    <a:solidFill>
+                      <a:schemeClr val="accent3">
+                        <a:lumMod val="60000"/>
+                        <a:lumOff val="40000"/>
+                      </a:schemeClr>
+                    </a:solidFill>
+                  </a:tcPr>
+                </a:tc>
+                <a:tc>
+                  <a:txBody>
+                    <a:bodyPr/>
+                    <a:lstStyle/>
+                    <a:p>
+                      <a:r>
+                        <a:rPr lang="en-US" sz="1400" dirty="0" err="1" smtClean="0"/>
+                        <a:t>N_e</a:t>
+                      </a:r>
+                      <a:endParaRPr lang="en-US" sz="1400" dirty="0"/>
+                    </a:p>
+                  </a:txBody>
+                  <a:tcPr>
+                    <a:solidFill>
+                      <a:schemeClr val="accent3">
+                        <a:lumMod val="60000"/>
+                        <a:lumOff val="40000"/>
+                      </a:schemeClr>
+                    </a:solidFill>
+                  </a:tcPr>
+                </a:tc>
+                <a:tc>
+                  <a:txBody>
+                    <a:bodyPr/>
+                    <a:lstStyle/>
+                    <a:p>
+                      <a:r>
+                        <a:rPr lang="en-US" sz="1400" dirty="0" err="1" smtClean="0"/>
+                        <a:t>N_b</a:t>
+                      </a:r>
+                      <a:endParaRPr lang="en-US" sz="1400" dirty="0"/>
+                    </a:p>
+                  </a:txBody>
+                  <a:tcPr>
+                    <a:solidFill>
+                      <a:schemeClr val="accent3">
+                        <a:lumMod val="60000"/>
+                        <a:lumOff val="40000"/>
+                      </a:schemeClr>
+                    </a:solidFill>
+                  </a:tcPr>
+                </a:tc>
+                <a:tc>
+                  <a:txBody>
+                    <a:bodyPr/>
+                    <a:lstStyle/>
+                    <a:p>
+                      <a:r>
+                        <a:rPr lang="en-US" sz="1400" dirty="0" smtClean="0"/>
+                        <a:t>N-t</a:t>
+                      </a:r>
+                      <a:endParaRPr lang="en-US" sz="1400" dirty="0"/>
+                    </a:p>
+                  </a:txBody>
+                  <a:tcPr>
+                    <a:solidFill>
+                      <a:schemeClr val="accent3">
+                        <a:lumMod val="60000"/>
+                        <a:lumOff val="40000"/>
+                      </a:schemeClr>
+                    </a:solidFill>
+                  </a:tcPr>
+                </a:tc>
+                <a:tc>
+                  <a:txBody>
+                    <a:bodyPr/>
+                    <a:lstStyle/>
+                    <a:p>
+                      <a:r>
+                        <a:rPr lang="en-US" sz="1400" dirty="0" err="1" smtClean="0"/>
+                        <a:t>I_h</a:t>
+                      </a:r>
+                      <a:endParaRPr lang="en-US" sz="1400" dirty="0"/>
+                    </a:p>
+                  </a:txBody>
+                  <a:tcPr>
+                    <a:solidFill>
+                      <a:schemeClr val="accent2">
+                        <a:lumMod val="20000"/>
+                        <a:lumOff val="80000"/>
+                      </a:schemeClr>
+                    </a:solidFill>
+                  </a:tcPr>
+                </a:tc>
+                <a:tc>
+                  <a:txBody>
+                    <a:bodyPr/>
+                    <a:lstStyle/>
+                    <a:p>
+                      <a:r>
+                        <a:rPr lang="en-US" sz="1400" dirty="0" err="1" smtClean="0"/>
+                        <a:t>I_g</a:t>
+                      </a:r>
+                      <a:endParaRPr lang="en-US" sz="1400" dirty="0"/>
+                    </a:p>
+                  </a:txBody>
+                  <a:tcPr>
+                    <a:solidFill>
+                      <a:schemeClr val="accent2">
+                        <a:lumMod val="20000"/>
+                        <a:lumOff val="80000"/>
+                      </a:schemeClr>
+                    </a:solidFill>
+                  </a:tcPr>
+                </a:tc>
+                <a:tc>
+                  <a:txBody>
+                    <a:bodyPr/>
+                    <a:lstStyle/>
+                    <a:p>
+                      <a:r>
+                        <a:rPr lang="en-US" sz="1400" dirty="0" err="1" smtClean="0"/>
+                        <a:t>I_t</a:t>
+                      </a:r>
+                      <a:endParaRPr lang="en-US" sz="1400" dirty="0"/>
+                    </a:p>
+                  </a:txBody>
+                  <a:tcPr>
+                    <a:solidFill>
+                      <a:schemeClr val="accent2">
+                        <a:lumMod val="20000"/>
+                        <a:lumOff val="80000"/>
+                      </a:schemeClr>
+                    </a:solidFill>
+                  </a:tcPr>
+                </a:tc>
+                <a:tc>
+                  <a:txBody>
+                    <a:bodyPr/>
+                    <a:lstStyle/>
+                    <a:p>
+                      <a:r>
+                        <a:rPr lang="en-US" sz="1400" dirty="0" smtClean="0"/>
+                        <a:t>R</a:t>
+                      </a:r>
+                      <a:r>
+                        <a:rPr lang="en-US" sz="1400" baseline="30000" dirty="0" smtClean="0"/>
+                        <a:t>2</a:t>
+                      </a:r>
+                      <a:endParaRPr lang="en-US" sz="1400" baseline="30000" dirty="0"/>
+                    </a:p>
+                  </a:txBody>
+                  <a:tcPr>
+                    <a:solidFill>
+                      <a:schemeClr val="tx1">
+                        <a:lumMod val="50000"/>
+                        <a:lumOff val="50000"/>
+                      </a:schemeClr>
+                    </a:solidFill>
+                  </a:tcPr>
+                </a:tc>
+              </a:tr>
+              <a:tr h="370840">
+                <a:tc>
+                  <a:txBody>
+                    <a:bodyPr/>
+                    <a:lstStyle/>
+                    <a:p>
+                      <a:r>
+                        <a:rPr lang="en-US" sz="1400" b="1" dirty="0" err="1" smtClean="0"/>
+                        <a:t>N_h</a:t>
+                      </a:r>
+                      <a:endParaRPr lang="en-US" sz="1400" b="1" dirty="0"/>
+                    </a:p>
+                  </a:txBody>
+                  <a:tcPr>
+                    <a:solidFill>
+                      <a:srgbClr val="C3D69B"/>
+                    </a:solidFill>
+                  </a:tcPr>
+                </a:tc>
+                <a:tc>
+                  <a:txBody>
+                    <a:bodyPr/>
+                    <a:lstStyle/>
+                    <a:p>
+                      <a:pPr marL="0" marR="0" indent="0" algn="l" defTabSz="457200" rtl="0" eaLnBrk="1" fontAlgn="auto" latinLnBrk="0" hangingPunct="1">
+                        <a:lnSpc>
+                          <a:spcPct val="100000"/>
+                        </a:lnSpc>
+                        <a:spcBef>
+                          <a:spcPts val="0"/>
+                        </a:spcBef>
+                        <a:spcAft>
+                          <a:spcPts val="0"/>
+                        </a:spcAft>
+                        <a:buClrTx/>
+                        <a:buSzTx/>
+                        <a:buFontTx/>
+                        <a:buNone/>
+                        <a:tabLst/>
+                        <a:defRPr/>
+                      </a:pPr>
+                      <a:endParaRPr lang="en-US" sz="1400" dirty="0" smtClean="0"/>
+                    </a:p>
+                  </a:txBody>
+                  <a:tcPr/>
+                </a:tc>
+                <a:tc>
+                  <a:txBody>
+                    <a:bodyPr/>
+                    <a:lstStyle/>
+                    <a:p>
+                      <a:endParaRPr lang="en-US" sz="1400" dirty="0"/>
+                    </a:p>
+                  </a:txBody>
+                  <a:tcPr/>
+                </a:tc>
+                <a:tc>
+                  <a:txBody>
+                    <a:bodyPr/>
+                    <a:lstStyle/>
+                    <a:p>
+                      <a:endParaRPr lang="en-US" sz="1400" dirty="0" smtClean="0"/>
+                    </a:p>
+                  </a:txBody>
+                  <a:tcPr/>
+                </a:tc>
+                <a:tc>
+                  <a:txBody>
+                    <a:bodyPr/>
+                    <a:lstStyle/>
+                    <a:p>
+                      <a:endParaRPr lang="en-US" sz="1400" dirty="0"/>
+                    </a:p>
+                  </a:txBody>
+                  <a:tcPr/>
+                </a:tc>
+                <a:tc>
+                  <a:txBody>
+                    <a:bodyPr/>
+                    <a:lstStyle/>
+                    <a:p>
+                      <a:endParaRPr lang="en-US" sz="1400" dirty="0"/>
+                    </a:p>
+                  </a:txBody>
+                  <a:tcPr/>
+                </a:tc>
+                <a:tc>
+                  <a:txBody>
+                    <a:bodyPr/>
+                    <a:lstStyle/>
+                    <a:p>
+                      <a:endParaRPr lang="en-US" dirty="0"/>
+                    </a:p>
+                  </a:txBody>
+                  <a:tcPr/>
+                </a:tc>
+                <a:tc>
+                  <a:txBody>
+                    <a:bodyPr/>
+                    <a:lstStyle/>
+                    <a:p>
+                      <a:endParaRPr lang="en-US" dirty="0"/>
+                    </a:p>
+                  </a:txBody>
+                  <a:tcPr/>
+                </a:tc>
+                <a:tc>
+                  <a:txBody>
+                    <a:bodyPr/>
+                    <a:lstStyle/>
+                    <a:p>
+                      <a:r>
+                        <a:rPr lang="en-US" sz="1400" dirty="0" smtClean="0"/>
+                        <a:t>0.38</a:t>
+                      </a:r>
+                      <a:endParaRPr lang="en-US" sz="1400" dirty="0"/>
+                    </a:p>
+                  </a:txBody>
+                  <a:tcPr/>
+                </a:tc>
+                <a:tc>
+                  <a:txBody>
+                    <a:bodyPr/>
+                    <a:lstStyle/>
+                    <a:p>
+                      <a:r>
+                        <a:rPr lang="en-US" sz="1400" dirty="0" smtClean="0"/>
+                        <a:t>-0.30</a:t>
+                      </a:r>
+                      <a:endParaRPr lang="en-US" sz="1400" dirty="0"/>
+                    </a:p>
+                  </a:txBody>
+                  <a:tcPr/>
+                </a:tc>
+                <a:tc>
+                  <a:txBody>
+                    <a:bodyPr/>
+                    <a:lstStyle/>
+                    <a:p>
+                      <a:r>
+                        <a:rPr lang="en-US" sz="1400" b="0" dirty="0" smtClean="0"/>
+                        <a:t>0.01</a:t>
+                      </a:r>
+                      <a:endParaRPr lang="en-US" sz="1400" b="0" dirty="0"/>
+                    </a:p>
+                  </a:txBody>
+                  <a:tcPr/>
+                </a:tc>
+              </a:tr>
+              <a:tr h="370840">
+                <a:tc>
+                  <a:txBody>
+                    <a:bodyPr/>
+                    <a:lstStyle/>
+                    <a:p>
+                      <a:r>
+                        <a:rPr lang="en-US" sz="1400" b="1" dirty="0" err="1" smtClean="0"/>
+                        <a:t>N_g</a:t>
+                      </a:r>
+                      <a:endParaRPr lang="en-US" sz="1400" b="1" dirty="0"/>
+                    </a:p>
+                  </a:txBody>
+                  <a:tcPr>
+                    <a:solidFill>
+                      <a:srgbClr val="C3D69B"/>
+                    </a:solidFill>
+                  </a:tcPr>
+                </a:tc>
+                <a:tc>
+                  <a:txBody>
+                    <a:bodyPr/>
+                    <a:lstStyle/>
+                    <a:p>
+                      <a:endParaRPr lang="en-US" sz="1400" dirty="0"/>
+                    </a:p>
+                  </a:txBody>
+                  <a:tcPr/>
+                </a:tc>
+                <a:tc>
+                  <a:txBody>
+                    <a:bodyPr/>
+                    <a:lstStyle/>
+                    <a:p>
+                      <a:endParaRPr lang="en-US" sz="1400" dirty="0"/>
+                    </a:p>
+                  </a:txBody>
+                  <a:tcPr/>
+                </a:tc>
+                <a:tc>
+                  <a:txBody>
+                    <a:bodyPr/>
+                    <a:lstStyle/>
+                    <a:p>
+                      <a:endParaRPr lang="en-US" sz="1400" dirty="0"/>
+                    </a:p>
+                  </a:txBody>
+                  <a:tcPr/>
+                </a:tc>
+                <a:tc>
+                  <a:txBody>
+                    <a:bodyPr/>
+                    <a:lstStyle/>
+                    <a:p>
+                      <a:endParaRPr lang="en-US" sz="1400" dirty="0"/>
+                    </a:p>
+                  </a:txBody>
+                  <a:tcPr/>
+                </a:tc>
+                <a:tc>
+                  <a:txBody>
+                    <a:bodyPr/>
+                    <a:lstStyle/>
+                    <a:p>
+                      <a:r>
+                        <a:rPr lang="en-US" sz="1400" dirty="0" smtClean="0"/>
+                        <a:t>5.98</a:t>
+                      </a:r>
+                      <a:endParaRPr lang="en-US" sz="1400" dirty="0"/>
+                    </a:p>
+                  </a:txBody>
+                  <a:tcPr/>
+                </a:tc>
+                <a:tc>
+                  <a:txBody>
+                    <a:bodyPr/>
+                    <a:lstStyle/>
+                    <a:p>
+                      <a:r>
+                        <a:rPr lang="en-US" sz="1400" dirty="0" smtClean="0"/>
+                        <a:t>-0.43</a:t>
+                      </a:r>
+                      <a:endParaRPr lang="en-US" sz="1400" dirty="0"/>
+                    </a:p>
+                  </a:txBody>
+                  <a:tcPr/>
+                </a:tc>
+                <a:tc>
+                  <a:txBody>
+                    <a:bodyPr/>
+                    <a:lstStyle/>
+                    <a:p>
+                      <a:endParaRPr lang="en-US" sz="1400" dirty="0"/>
+                    </a:p>
+                  </a:txBody>
+                  <a:tcPr/>
+                </a:tc>
+                <a:tc>
+                  <a:txBody>
+                    <a:bodyPr/>
+                    <a:lstStyle/>
+                    <a:p>
+                      <a:endParaRPr lang="en-US" sz="1400" baseline="30000" dirty="0"/>
+                    </a:p>
+                  </a:txBody>
+                  <a:tcPr/>
+                </a:tc>
+                <a:tc>
+                  <a:txBody>
+                    <a:bodyPr/>
+                    <a:lstStyle/>
+                    <a:p>
+                      <a:endParaRPr lang="en-US" sz="1400" dirty="0"/>
+                    </a:p>
+                  </a:txBody>
+                  <a:tcPr/>
+                </a:tc>
+                <a:tc>
+                  <a:txBody>
+                    <a:bodyPr/>
+                    <a:lstStyle/>
+                    <a:p>
+                      <a:r>
+                        <a:rPr lang="en-US" sz="1400" b="1" dirty="0" smtClean="0"/>
+                        <a:t>0.20</a:t>
+                      </a:r>
+                      <a:endParaRPr lang="en-US" sz="1400" b="1" dirty="0"/>
+                    </a:p>
+                  </a:txBody>
+                  <a:tcPr/>
+                </a:tc>
+              </a:tr>
+              <a:tr h="370840">
+                <a:tc>
+                  <a:txBody>
+                    <a:bodyPr/>
+                    <a:lstStyle/>
+                    <a:p>
+                      <a:r>
+                        <a:rPr lang="en-US" sz="1400" b="1" dirty="0" err="1" smtClean="0"/>
+                        <a:t>N_e</a:t>
+                      </a:r>
+                      <a:endParaRPr lang="en-US" sz="1400" b="1" dirty="0"/>
+                    </a:p>
+                  </a:txBody>
+                  <a:tcPr>
+                    <a:solidFill>
+                      <a:srgbClr val="C3D69B"/>
+                    </a:solidFill>
+                  </a:tcPr>
+                </a:tc>
+                <a:tc>
+                  <a:txBody>
+                    <a:bodyPr/>
+                    <a:lstStyle/>
+                    <a:p>
+                      <a:r>
+                        <a:rPr lang="en-US" sz="1400" dirty="0" smtClean="0"/>
+                        <a:t>4.70</a:t>
+                      </a:r>
+                      <a:endParaRPr lang="en-US" sz="1400" dirty="0"/>
+                    </a:p>
+                  </a:txBody>
+                  <a:tcPr/>
+                </a:tc>
+                <a:tc>
+                  <a:txBody>
+                    <a:bodyPr/>
+                    <a:lstStyle/>
+                    <a:p>
+                      <a:endParaRPr lang="en-US" sz="1400" dirty="0"/>
+                    </a:p>
+                  </a:txBody>
+                  <a:tcPr/>
+                </a:tc>
+                <a:tc>
+                  <a:txBody>
+                    <a:bodyPr/>
+                    <a:lstStyle/>
+                    <a:p>
+                      <a:endParaRPr lang="en-US" sz="1400" dirty="0"/>
+                    </a:p>
+                  </a:txBody>
+                  <a:tcPr/>
+                </a:tc>
+                <a:tc>
+                  <a:txBody>
+                    <a:bodyPr/>
+                    <a:lstStyle/>
+                    <a:p>
+                      <a:endParaRPr lang="en-US" sz="1400" dirty="0"/>
+                    </a:p>
+                  </a:txBody>
+                  <a:tcPr/>
+                </a:tc>
+                <a:tc>
+                  <a:txBody>
+                    <a:bodyPr/>
+                    <a:lstStyle/>
+                    <a:p>
+                      <a:endParaRPr lang="en-US" sz="1400" dirty="0"/>
+                    </a:p>
+                  </a:txBody>
+                  <a:tcPr/>
+                </a:tc>
+                <a:tc>
+                  <a:txBody>
+                    <a:bodyPr/>
+                    <a:lstStyle/>
+                    <a:p>
+                      <a:endParaRPr lang="en-US" sz="1400" dirty="0"/>
+                    </a:p>
+                  </a:txBody>
+                  <a:tcPr/>
+                </a:tc>
+                <a:tc>
+                  <a:txBody>
+                    <a:bodyPr/>
+                    <a:lstStyle/>
+                    <a:p>
+                      <a:endParaRPr lang="en-US" sz="1400" dirty="0"/>
+                    </a:p>
+                  </a:txBody>
+                  <a:tcPr/>
+                </a:tc>
+                <a:tc>
+                  <a:txBody>
+                    <a:bodyPr/>
+                    <a:lstStyle/>
+                    <a:p>
+                      <a:endParaRPr lang="en-US" sz="1400" dirty="0"/>
+                    </a:p>
+                  </a:txBody>
+                  <a:tcPr/>
+                </a:tc>
+                <a:tc>
+                  <a:txBody>
+                    <a:bodyPr/>
+                    <a:lstStyle/>
+                    <a:p>
+                      <a:endParaRPr lang="en-US" sz="1400"/>
+                    </a:p>
+                  </a:txBody>
+                  <a:tcPr/>
+                </a:tc>
+                <a:tc>
+                  <a:txBody>
+                    <a:bodyPr/>
+                    <a:lstStyle/>
+                    <a:p>
+                      <a:r>
+                        <a:rPr lang="en-US" sz="1400" b="1" dirty="0" smtClean="0"/>
+                        <a:t>0.14</a:t>
+                      </a:r>
+                      <a:endParaRPr lang="en-US" sz="1400" b="1" dirty="0"/>
+                    </a:p>
+                  </a:txBody>
+                  <a:tcPr/>
+                </a:tc>
+              </a:tr>
+              <a:tr h="370840">
+                <a:tc>
+                  <a:txBody>
+                    <a:bodyPr/>
+                    <a:lstStyle/>
+                    <a:p>
+                      <a:r>
+                        <a:rPr lang="en-US" sz="1400" b="1" dirty="0" err="1" smtClean="0"/>
+                        <a:t>N_b</a:t>
+                      </a:r>
+                      <a:endParaRPr lang="en-US" sz="1400" b="1" dirty="0"/>
+                    </a:p>
+                  </a:txBody>
+                  <a:tcPr>
+                    <a:solidFill>
+                      <a:srgbClr val="C3D69B"/>
+                    </a:solidFill>
+                  </a:tcPr>
+                </a:tc>
+                <a:tc>
+                  <a:txBody>
+                    <a:bodyPr/>
+                    <a:lstStyle/>
+                    <a:p>
+                      <a:endParaRPr lang="en-US" sz="1400" dirty="0"/>
+                    </a:p>
+                  </a:txBody>
+                  <a:tcPr/>
+                </a:tc>
+                <a:tc>
+                  <a:txBody>
+                    <a:bodyPr/>
+                    <a:lstStyle/>
+                    <a:p>
+                      <a:endParaRPr lang="en-US" sz="1400" dirty="0"/>
+                    </a:p>
+                  </a:txBody>
+                  <a:tcPr/>
+                </a:tc>
+                <a:tc>
+                  <a:txBody>
+                    <a:bodyPr/>
+                    <a:lstStyle/>
+                    <a:p>
+                      <a:r>
+                        <a:rPr lang="en-US" sz="1400" dirty="0" smtClean="0"/>
+                        <a:t>0.02</a:t>
+                      </a:r>
+                      <a:endParaRPr lang="en-US" sz="1400" dirty="0"/>
+                    </a:p>
+                  </a:txBody>
+                  <a:tcPr/>
+                </a:tc>
+                <a:tc>
+                  <a:txBody>
+                    <a:bodyPr/>
+                    <a:lstStyle/>
+                    <a:p>
+                      <a:endParaRPr lang="en-US" sz="1400" dirty="0"/>
+                    </a:p>
+                  </a:txBody>
+                  <a:tcPr/>
+                </a:tc>
+                <a:tc>
+                  <a:txBody>
+                    <a:bodyPr/>
+                    <a:lstStyle/>
+                    <a:p>
+                      <a:endParaRPr lang="en-US" sz="1400" dirty="0"/>
+                    </a:p>
+                  </a:txBody>
+                  <a:tcPr/>
+                </a:tc>
+                <a:tc>
+                  <a:txBody>
+                    <a:bodyPr/>
+                    <a:lstStyle/>
+                    <a:p>
+                      <a:endParaRPr lang="en-US" sz="1400" dirty="0"/>
+                    </a:p>
+                  </a:txBody>
+                  <a:tcPr/>
+                </a:tc>
+                <a:tc>
+                  <a:txBody>
+                    <a:bodyPr/>
+                    <a:lstStyle/>
+                    <a:p>
+                      <a:endParaRPr lang="en-US" sz="1400" dirty="0"/>
+                    </a:p>
+                  </a:txBody>
+                  <a:tcPr/>
+                </a:tc>
+                <a:tc>
+                  <a:txBody>
+                    <a:bodyPr/>
+                    <a:lstStyle/>
+                    <a:p>
+                      <a:r>
+                        <a:rPr lang="en-US" sz="1400" dirty="0" smtClean="0"/>
+                        <a:t>0.03</a:t>
+                      </a:r>
+                      <a:endParaRPr lang="en-US" sz="1400" dirty="0"/>
+                    </a:p>
+                  </a:txBody>
+                  <a:tcPr/>
+                </a:tc>
+                <a:tc>
+                  <a:txBody>
+                    <a:bodyPr/>
+                    <a:lstStyle/>
+                    <a:p>
+                      <a:endParaRPr lang="en-US" sz="1400" dirty="0"/>
+                    </a:p>
+                  </a:txBody>
+                  <a:tcPr/>
+                </a:tc>
+                <a:tc>
+                  <a:txBody>
+                    <a:bodyPr/>
+                    <a:lstStyle/>
+                    <a:p>
+                      <a:r>
+                        <a:rPr lang="en-US" sz="1400" dirty="0" smtClean="0"/>
+                        <a:t>0.03</a:t>
+                      </a:r>
+                      <a:endParaRPr lang="en-US" sz="1400" dirty="0"/>
+                    </a:p>
+                  </a:txBody>
+                  <a:tcPr/>
+                </a:tc>
+              </a:tr>
+              <a:tr h="370840">
+                <a:tc>
+                  <a:txBody>
+                    <a:bodyPr/>
+                    <a:lstStyle/>
+                    <a:p>
+                      <a:r>
+                        <a:rPr lang="en-US" sz="1400" b="1" dirty="0" smtClean="0"/>
+                        <a:t>N-t</a:t>
+                      </a:r>
+                      <a:endParaRPr lang="en-US" sz="1400" b="1" dirty="0"/>
+                    </a:p>
+                  </a:txBody>
+                  <a:tcPr>
+                    <a:solidFill>
+                      <a:srgbClr val="C3D69B"/>
+                    </a:solidFill>
+                  </a:tcPr>
+                </a:tc>
+                <a:tc>
+                  <a:txBody>
+                    <a:bodyPr/>
+                    <a:lstStyle/>
+                    <a:p>
+                      <a:r>
+                        <a:rPr lang="en-US" sz="1400" dirty="0" smtClean="0"/>
+                        <a:t>1.03</a:t>
+                      </a:r>
+                      <a:endParaRPr lang="en-US" sz="1400" dirty="0"/>
+                    </a:p>
+                  </a:txBody>
+                  <a:tcPr/>
+                </a:tc>
+                <a:tc>
+                  <a:txBody>
+                    <a:bodyPr/>
+                    <a:lstStyle/>
+                    <a:p>
+                      <a:endParaRPr lang="en-US" sz="1400" dirty="0"/>
+                    </a:p>
+                  </a:txBody>
+                  <a:tcPr/>
+                </a:tc>
+                <a:tc>
+                  <a:txBody>
+                    <a:bodyPr/>
+                    <a:lstStyle/>
+                    <a:p>
+                      <a:endParaRPr lang="en-US" sz="1400" dirty="0"/>
+                    </a:p>
+                  </a:txBody>
+                  <a:tcPr/>
+                </a:tc>
+                <a:tc>
+                  <a:txBody>
+                    <a:bodyPr/>
+                    <a:lstStyle/>
+                    <a:p>
+                      <a:endParaRPr lang="en-US" sz="1400" dirty="0"/>
+                    </a:p>
+                  </a:txBody>
+                  <a:tcPr/>
+                </a:tc>
+                <a:tc>
+                  <a:txBody>
+                    <a:bodyPr/>
+                    <a:lstStyle/>
+                    <a:p>
+                      <a:endParaRPr lang="en-US" sz="1400"/>
+                    </a:p>
+                  </a:txBody>
+                  <a:tcPr/>
+                </a:tc>
+                <a:tc>
+                  <a:txBody>
+                    <a:bodyPr/>
+                    <a:lstStyle/>
+                    <a:p>
+                      <a:endParaRPr lang="en-US" sz="1400"/>
+                    </a:p>
+                  </a:txBody>
+                  <a:tcPr/>
+                </a:tc>
+                <a:tc>
+                  <a:txBody>
+                    <a:bodyPr/>
+                    <a:lstStyle/>
+                    <a:p>
+                      <a:endParaRPr lang="en-US" sz="1400"/>
+                    </a:p>
+                  </a:txBody>
+                  <a:tcPr/>
+                </a:tc>
+                <a:tc>
+                  <a:txBody>
+                    <a:bodyPr/>
+                    <a:lstStyle/>
+                    <a:p>
+                      <a:endParaRPr lang="en-US" sz="1400" dirty="0"/>
+                    </a:p>
+                  </a:txBody>
+                  <a:tcPr/>
+                </a:tc>
+                <a:tc>
+                  <a:txBody>
+                    <a:bodyPr/>
+                    <a:lstStyle/>
+                    <a:p>
+                      <a:endParaRPr lang="en-US" sz="1400"/>
+                    </a:p>
+                  </a:txBody>
+                  <a:tcPr/>
+                </a:tc>
+                <a:tc>
+                  <a:txBody>
+                    <a:bodyPr/>
+                    <a:lstStyle/>
+                    <a:p>
+                      <a:r>
+                        <a:rPr lang="en-US" sz="1400" dirty="0" smtClean="0"/>
+                        <a:t>0.02</a:t>
+                      </a:r>
+                      <a:endParaRPr lang="en-US" sz="1400" dirty="0"/>
+                    </a:p>
+                  </a:txBody>
+                  <a:tcPr/>
+                </a:tc>
+              </a:tr>
+              <a:tr h="370840">
+                <a:tc>
+                  <a:txBody>
+                    <a:bodyPr/>
+                    <a:lstStyle/>
+                    <a:p>
+                      <a:r>
+                        <a:rPr lang="en-US" sz="1400" b="1" dirty="0" err="1" smtClean="0"/>
+                        <a:t>I_h</a:t>
+                      </a:r>
+                      <a:endParaRPr lang="en-US" sz="1400" b="1" dirty="0"/>
+                    </a:p>
+                  </a:txBody>
+                  <a:tcPr>
+                    <a:solidFill>
+                      <a:srgbClr val="F2DCDB"/>
+                    </a:solidFill>
+                  </a:tcPr>
+                </a:tc>
+                <a:tc>
+                  <a:txBody>
+                    <a:bodyPr/>
+                    <a:lstStyle/>
+                    <a:p>
+                      <a:endParaRPr lang="en-US" sz="1400" dirty="0"/>
+                    </a:p>
+                  </a:txBody>
+                  <a:tcPr/>
+                </a:tc>
+                <a:tc>
+                  <a:txBody>
+                    <a:bodyPr/>
+                    <a:lstStyle/>
+                    <a:p>
+                      <a:endParaRPr lang="en-US" sz="1400" dirty="0"/>
+                    </a:p>
+                  </a:txBody>
+                  <a:tcPr/>
+                </a:tc>
+                <a:tc>
+                  <a:txBody>
+                    <a:bodyPr/>
+                    <a:lstStyle/>
+                    <a:p>
+                      <a:r>
+                        <a:rPr lang="en-US" sz="1400" dirty="0" smtClean="0"/>
+                        <a:t>-0.07</a:t>
+                      </a:r>
+                      <a:endParaRPr lang="en-US" sz="1400" dirty="0"/>
+                    </a:p>
+                  </a:txBody>
+                  <a:tcPr/>
+                </a:tc>
+                <a:tc>
+                  <a:txBody>
+                    <a:bodyPr/>
+                    <a:lstStyle/>
+                    <a:p>
+                      <a:endParaRPr lang="en-US" sz="1400" dirty="0"/>
+                    </a:p>
+                  </a:txBody>
+                  <a:tcPr/>
+                </a:tc>
+                <a:tc>
+                  <a:txBody>
+                    <a:bodyPr/>
+                    <a:lstStyle/>
+                    <a:p>
+                      <a:endParaRPr lang="en-US" sz="1400" dirty="0"/>
+                    </a:p>
+                  </a:txBody>
+                  <a:tcPr/>
+                </a:tc>
+                <a:tc>
+                  <a:txBody>
+                    <a:bodyPr/>
+                    <a:lstStyle/>
+                    <a:p>
+                      <a:endParaRPr lang="en-US" sz="1400" dirty="0"/>
+                    </a:p>
+                  </a:txBody>
+                  <a:tcPr/>
+                </a:tc>
+                <a:tc>
+                  <a:txBody>
+                    <a:bodyPr/>
+                    <a:lstStyle/>
+                    <a:p>
+                      <a:endParaRPr lang="en-US" sz="1400" dirty="0"/>
+                    </a:p>
+                  </a:txBody>
+                  <a:tcPr/>
+                </a:tc>
+                <a:tc>
+                  <a:txBody>
+                    <a:bodyPr/>
+                    <a:lstStyle/>
+                    <a:p>
+                      <a:endParaRPr lang="en-US" sz="1400" dirty="0"/>
+                    </a:p>
+                  </a:txBody>
+                  <a:tcPr/>
+                </a:tc>
+                <a:tc>
+                  <a:txBody>
+                    <a:bodyPr/>
+                    <a:lstStyle/>
+                    <a:p>
+                      <a:r>
+                        <a:rPr lang="en-US" sz="1400" dirty="0" smtClean="0"/>
+                        <a:t>0.11</a:t>
+                      </a:r>
+                      <a:endParaRPr lang="en-US" sz="1400" dirty="0"/>
+                    </a:p>
+                  </a:txBody>
+                  <a:tcPr/>
+                </a:tc>
+                <a:tc>
+                  <a:txBody>
+                    <a:bodyPr/>
+                    <a:lstStyle/>
+                    <a:p>
+                      <a:r>
+                        <a:rPr lang="en-US" sz="1400" dirty="0" smtClean="0"/>
+                        <a:t>0.10</a:t>
+                      </a:r>
+                      <a:endParaRPr lang="en-US" sz="1400" dirty="0"/>
+                    </a:p>
+                  </a:txBody>
+                  <a:tcPr/>
+                </a:tc>
+              </a:tr>
+              <a:tr h="370840">
+                <a:tc>
+                  <a:txBody>
+                    <a:bodyPr/>
+                    <a:lstStyle/>
+                    <a:p>
+                      <a:r>
+                        <a:rPr lang="en-US" sz="1400" b="1" dirty="0" err="1" smtClean="0"/>
+                        <a:t>I_g</a:t>
+                      </a:r>
+                      <a:endParaRPr lang="en-US" sz="1400" b="1" dirty="0"/>
+                    </a:p>
+                  </a:txBody>
+                  <a:tcPr>
+                    <a:solidFill>
+                      <a:srgbClr val="F2DCDB"/>
+                    </a:solidFill>
+                  </a:tcPr>
+                </a:tc>
+                <a:tc>
+                  <a:txBody>
+                    <a:bodyPr/>
+                    <a:lstStyle/>
+                    <a:p>
+                      <a:r>
+                        <a:rPr lang="en-US" sz="1400" dirty="0" smtClean="0"/>
+                        <a:t>-7.6</a:t>
+                      </a:r>
+                      <a:endParaRPr lang="en-US" sz="1400" dirty="0"/>
+                    </a:p>
+                  </a:txBody>
+                  <a:tcPr/>
+                </a:tc>
+                <a:tc>
+                  <a:txBody>
+                    <a:bodyPr/>
+                    <a:lstStyle/>
+                    <a:p>
+                      <a:endParaRPr lang="en-US" sz="1400" dirty="0"/>
+                    </a:p>
+                  </a:txBody>
+                  <a:tcPr/>
+                </a:tc>
+                <a:tc>
+                  <a:txBody>
+                    <a:bodyPr/>
+                    <a:lstStyle/>
+                    <a:p>
+                      <a:endParaRPr lang="en-US" sz="1400" dirty="0"/>
+                    </a:p>
+                  </a:txBody>
+                  <a:tcPr/>
+                </a:tc>
+                <a:tc>
+                  <a:txBody>
+                    <a:bodyPr/>
+                    <a:lstStyle/>
+                    <a:p>
+                      <a:endParaRPr lang="en-US" sz="1400" dirty="0"/>
+                    </a:p>
+                  </a:txBody>
+                  <a:tcPr/>
+                </a:tc>
+                <a:tc>
+                  <a:txBody>
+                    <a:bodyPr/>
+                    <a:lstStyle/>
+                    <a:p>
+                      <a:endParaRPr lang="en-US" sz="1400" dirty="0"/>
+                    </a:p>
+                  </a:txBody>
+                  <a:tcPr/>
+                </a:tc>
+                <a:tc>
+                  <a:txBody>
+                    <a:bodyPr/>
+                    <a:lstStyle/>
+                    <a:p>
+                      <a:endParaRPr lang="en-US" sz="1400" dirty="0"/>
+                    </a:p>
+                  </a:txBody>
+                  <a:tcPr/>
+                </a:tc>
+                <a:tc>
+                  <a:txBody>
+                    <a:bodyPr/>
+                    <a:lstStyle/>
+                    <a:p>
+                      <a:endParaRPr lang="en-US" sz="1400" dirty="0"/>
+                    </a:p>
+                  </a:txBody>
+                  <a:tcPr/>
+                </a:tc>
+                <a:tc>
+                  <a:txBody>
+                    <a:bodyPr/>
+                    <a:lstStyle/>
+                    <a:p>
+                      <a:endParaRPr lang="en-US" sz="1400" dirty="0"/>
+                    </a:p>
+                  </a:txBody>
+                  <a:tcPr/>
+                </a:tc>
+                <a:tc>
+                  <a:txBody>
+                    <a:bodyPr/>
+                    <a:lstStyle/>
+                    <a:p>
+                      <a:r>
+                        <a:rPr lang="en-US" sz="1400" dirty="0" smtClean="0"/>
+                        <a:t>0.29</a:t>
+                      </a:r>
+                      <a:endParaRPr lang="en-US" sz="1400" dirty="0"/>
+                    </a:p>
+                  </a:txBody>
+                  <a:tcPr/>
+                </a:tc>
+                <a:tc>
+                  <a:txBody>
+                    <a:bodyPr/>
+                    <a:lstStyle/>
+                    <a:p>
+                      <a:r>
+                        <a:rPr lang="en-US" sz="1400" dirty="0" smtClean="0"/>
+                        <a:t>0.12</a:t>
+                      </a:r>
+                      <a:endParaRPr lang="en-US" sz="1400" dirty="0"/>
+                    </a:p>
+                  </a:txBody>
+                  <a:tcPr/>
+                </a:tc>
+              </a:tr>
+              <a:tr h="370840">
+                <a:tc>
+                  <a:txBody>
+                    <a:bodyPr/>
+                    <a:lstStyle/>
+                    <a:p>
+                      <a:pPr marL="0" marR="0" indent="0" algn="l" defTabSz="457200" rtl="0" eaLnBrk="1" fontAlgn="auto" latinLnBrk="0" hangingPunct="1">
+                        <a:lnSpc>
+                          <a:spcPct val="100000"/>
+                        </a:lnSpc>
+                        <a:spcBef>
+                          <a:spcPts val="0"/>
+                        </a:spcBef>
+                        <a:spcAft>
+                          <a:spcPts val="0"/>
+                        </a:spcAft>
+                        <a:buClrTx/>
+                        <a:buSzTx/>
+                        <a:buFontTx/>
+                        <a:buNone/>
+                        <a:tabLst/>
+                        <a:defRPr/>
+                      </a:pPr>
+                      <a:r>
+                        <a:rPr lang="en-US" sz="1400" b="1" dirty="0" err="1" smtClean="0"/>
+                        <a:t>I_t</a:t>
+                      </a:r>
+                      <a:endParaRPr lang="en-US" sz="1400" b="1" dirty="0" smtClean="0"/>
+                    </a:p>
+                  </a:txBody>
+                  <a:tcPr>
+                    <a:solidFill>
+                      <a:srgbClr val="F2DCDB"/>
+                    </a:solidFill>
+                  </a:tcPr>
+                </a:tc>
+                <a:tc>
+                  <a:txBody>
+                    <a:bodyPr/>
+                    <a:lstStyle/>
+                    <a:p>
+                      <a:endParaRPr lang="en-US" sz="1400" dirty="0"/>
+                    </a:p>
+                  </a:txBody>
+                  <a:tcPr/>
+                </a:tc>
+                <a:tc>
+                  <a:txBody>
+                    <a:bodyPr/>
+                    <a:lstStyle/>
+                    <a:p>
+                      <a:endParaRPr lang="en-US" sz="1400" dirty="0"/>
+                    </a:p>
+                  </a:txBody>
+                  <a:tcPr/>
+                </a:tc>
+                <a:tc>
+                  <a:txBody>
+                    <a:bodyPr/>
+                    <a:lstStyle/>
+                    <a:p>
+                      <a:endParaRPr lang="en-US" sz="1400"/>
+                    </a:p>
+                  </a:txBody>
+                  <a:tcPr/>
+                </a:tc>
+                <a:tc>
+                  <a:txBody>
+                    <a:bodyPr/>
+                    <a:lstStyle/>
+                    <a:p>
+                      <a:endParaRPr lang="en-US" sz="1400"/>
+                    </a:p>
+                  </a:txBody>
+                  <a:tcPr/>
+                </a:tc>
+                <a:tc>
+                  <a:txBody>
+                    <a:bodyPr/>
+                    <a:lstStyle/>
+                    <a:p>
+                      <a:endParaRPr lang="en-US" sz="1400"/>
+                    </a:p>
+                  </a:txBody>
+                  <a:tcPr/>
+                </a:tc>
+                <a:tc>
+                  <a:txBody>
+                    <a:bodyPr/>
+                    <a:lstStyle/>
+                    <a:p>
+                      <a:endParaRPr lang="en-US" sz="1400"/>
+                    </a:p>
+                  </a:txBody>
+                  <a:tcPr/>
+                </a:tc>
+                <a:tc>
+                  <a:txBody>
+                    <a:bodyPr/>
+                    <a:lstStyle/>
+                    <a:p>
+                      <a:endParaRPr lang="en-US" sz="1400"/>
+                    </a:p>
+                  </a:txBody>
+                  <a:tcPr/>
+                </a:tc>
+                <a:tc>
+                  <a:txBody>
+                    <a:bodyPr/>
+                    <a:lstStyle/>
+                    <a:p>
+                      <a:endParaRPr lang="en-US" sz="1400"/>
+                    </a:p>
+                  </a:txBody>
+                  <a:tcPr/>
+                </a:tc>
+                <a:tc>
+                  <a:txBody>
+                    <a:bodyPr/>
+                    <a:lstStyle/>
+                    <a:p>
+                      <a:endParaRPr lang="en-US" sz="1400"/>
+                    </a:p>
+                  </a:txBody>
+                  <a:tcPr/>
+                </a:tc>
+                <a:tc>
+                  <a:txBody>
+                    <a:bodyPr/>
+                    <a:lstStyle/>
+                    <a:p>
+                      <a:endParaRPr lang="en-US" sz="1400" dirty="0"/>
+                    </a:p>
+                  </a:txBody>
+                  <a:tcPr/>
+                </a:tc>
+              </a:tr>
+            </a:tbl>
+          </a:graphicData>
+        </a:graphic>
+      </p:graphicFrame>
+      <p:sp>
+        <p:nvSpPr>
+          <p:cNvPr id="7" name="TextBox 6"/>
+          <p:cNvSpPr txBox="1"/>
+          <p:nvPr/>
+        </p:nvSpPr>
+        <p:spPr>
+          <a:xfrm>
+            <a:off x="474470" y="1234651"/>
+            <a:ext cx="6015101" cy="369332"/>
+          </a:xfrm>
+          <a:prstGeom prst="rect">
+            <a:avLst/>
+          </a:prstGeom>
+          <a:noFill/>
+        </p:spPr>
+        <p:txBody>
+          <a:bodyPr wrap="none" rtlCol="0">
+            <a:spAutoFit/>
+          </a:bodyPr>
+          <a:lstStyle/>
+          <a:p>
+            <a:r>
+              <a:rPr lang="en-US" dirty="0" smtClean="0"/>
+              <a:t>Total species cover changes over time (p-</a:t>
+            </a:r>
+            <a:r>
+              <a:rPr lang="en-US" dirty="0" err="1" smtClean="0"/>
+              <a:t>val</a:t>
+            </a:r>
+            <a:r>
+              <a:rPr lang="en-US" dirty="0" smtClean="0"/>
+              <a:t>&lt;0.001; R2=0.13)</a:t>
+            </a:r>
+            <a:endParaRPr lang="en-US" dirty="0"/>
+          </a:p>
+        </p:txBody>
+      </p:sp>
+      <p:sp>
+        <p:nvSpPr>
+          <p:cNvPr id="2" name="TextBox 1"/>
+          <p:cNvSpPr txBox="1"/>
+          <p:nvPr/>
+        </p:nvSpPr>
+        <p:spPr>
+          <a:xfrm>
+            <a:off x="2065337" y="6092645"/>
+            <a:ext cx="4057521" cy="646331"/>
+          </a:xfrm>
+          <a:prstGeom prst="rect">
+            <a:avLst/>
+          </a:prstGeom>
+          <a:noFill/>
+        </p:spPr>
+        <p:txBody>
+          <a:bodyPr wrap="none" rtlCol="0">
+            <a:spAutoFit/>
+          </a:bodyPr>
+          <a:lstStyle/>
+          <a:p>
+            <a:pPr marL="285750" indent="-285750">
+              <a:buFont typeface="Wingdings" charset="0"/>
+              <a:buChar char="è"/>
+            </a:pPr>
+            <a:r>
+              <a:rPr lang="en-US" dirty="0" smtClean="0">
+                <a:sym typeface="Wingdings"/>
+              </a:rPr>
+              <a:t>Add the </a:t>
+            </a:r>
+            <a:r>
+              <a:rPr lang="en-US" dirty="0" err="1" smtClean="0">
+                <a:sym typeface="Wingdings"/>
+              </a:rPr>
+              <a:t>spc</a:t>
+            </a:r>
+            <a:r>
+              <a:rPr lang="en-US" dirty="0" smtClean="0">
+                <a:sym typeface="Wingdings"/>
+              </a:rPr>
+              <a:t> richness and diversity?</a:t>
+            </a:r>
+          </a:p>
+          <a:p>
+            <a:pPr marL="285750" indent="-285750">
+              <a:buFont typeface="Wingdings" charset="0"/>
+              <a:buChar char="è"/>
+            </a:pPr>
+            <a:r>
+              <a:rPr lang="en-US" dirty="0" smtClean="0">
+                <a:sym typeface="Wingdings"/>
+              </a:rPr>
+              <a:t>Test only the periods starting in 2002?</a:t>
+            </a:r>
+            <a:endParaRPr lang="en-US" dirty="0"/>
+          </a:p>
+        </p:txBody>
+      </p:sp>
+    </p:spTree>
+    <p:extLst>
+      <p:ext uri="{BB962C8B-B14F-4D97-AF65-F5344CB8AC3E}">
+        <p14:creationId xmlns:p14="http://schemas.microsoft.com/office/powerpoint/2010/main" val="46018287"/>
+      </p:ext>
+    </p:extLst>
+  </p:cSld>
+  <p:clrMapOvr>
+    <a:masterClrMapping/>
+  </p:clrMapOvr>
+</p:sld>
+</file>
+
+<file path=ppt/slides/slide12.xml><?xml version="1.0" encoding="utf-8"?>
 <p:sld xmlns:a="http://schemas.openxmlformats.org/drawingml/2006/main" xmlns:r="http://schemas.openxmlformats.org/officeDocument/2006/relationships" xmlns:p="http://schemas.openxmlformats.org/presentationml/2006/main">
   <p:cSld>
     <p:bg>
@@ -5546,7 +7138,7 @@
 </p:sld>
 </file>
 
-<file path=ppt/slides/slide12.xml><?xml version="1.0" encoding="utf-8"?>
+<file path=ppt/slides/slide13.xml><?xml version="1.0" encoding="utf-8"?>
 <p:sld xmlns:a="http://schemas.openxmlformats.org/drawingml/2006/main" xmlns:r="http://schemas.openxmlformats.org/officeDocument/2006/relationships" xmlns:p="http://schemas.openxmlformats.org/presentationml/2006/main">
   <p:cSld>
     <p:bg>
@@ -7064,7 +8656,7 @@
 </p:sld>
 </file>
 
-<file path=ppt/slides/slide13.xml><?xml version="1.0" encoding="utf-8"?>
+<file path=ppt/slides/slide14.xml><?xml version="1.0" encoding="utf-8"?>
 <p:sld xmlns:a="http://schemas.openxmlformats.org/drawingml/2006/main" xmlns:r="http://schemas.openxmlformats.org/officeDocument/2006/relationships" xmlns:p="http://schemas.openxmlformats.org/presentationml/2006/main">
   <p:cSld>
     <p:bg>
@@ -7129,7 +8721,7 @@
           <p:nvPr>
             <p:extLst>
               <p:ext uri="{D42A27DB-BD31-4B8C-83A1-F6EECF244321}">
-                <p14:modId xmlns:p14="http://schemas.microsoft.com/office/powerpoint/2010/main" val="3992650815"/>
+                <p14:modId xmlns:p14="http://schemas.microsoft.com/office/powerpoint/2010/main" val="3843704737"/>
               </p:ext>
             </p:extLst>
           </p:nvPr>
@@ -7248,6 +8840,14 @@
                     <a:bodyPr/>
                     <a:lstStyle/>
                     <a:p>
+                      <a:r>
+                        <a:rPr lang="en-US" sz="1400" b="1" dirty="0" smtClean="0">
+                          <a:solidFill>
+                            <a:srgbClr val="008000"/>
+                          </a:solidFill>
+                        </a:rPr>
+                        <a:t>16.61</a:t>
+                      </a:r>
                       <a:endParaRPr lang="en-US" sz="1400" b="1" dirty="0">
                         <a:solidFill>
                           <a:srgbClr val="008000"/>
@@ -7262,6 +8862,14 @@
                     <a:bodyPr/>
                     <a:lstStyle/>
                     <a:p>
+                      <a:r>
+                        <a:rPr lang="en-US" sz="1400" b="1" dirty="0" smtClean="0">
+                          <a:solidFill>
+                            <a:srgbClr val="FF0000"/>
+                          </a:solidFill>
+                        </a:rPr>
+                        <a:t>-0.65</a:t>
+                      </a:r>
                       <a:endParaRPr lang="en-US" sz="1400" b="1" dirty="0">
                         <a:solidFill>
                           <a:srgbClr val="FF0000"/>
@@ -7276,6 +8884,10 @@
                     <a:bodyPr/>
                     <a:lstStyle/>
                     <a:p>
+                      <a:r>
+                        <a:rPr lang="en-US" sz="1400" b="1" dirty="0" smtClean="0"/>
+                        <a:t>0.01</a:t>
+                      </a:r>
                       <a:endParaRPr lang="en-US" sz="1400" b="1" dirty="0"/>
                     </a:p>
                   </a:txBody>
@@ -7319,6 +8931,14 @@
                     <a:bodyPr/>
                     <a:lstStyle/>
                     <a:p>
+                      <a:r>
+                        <a:rPr lang="en-US" sz="1400" dirty="0" smtClean="0">
+                          <a:solidFill>
+                            <a:srgbClr val="008000"/>
+                          </a:solidFill>
+                        </a:rPr>
+                        <a:t>-</a:t>
+                      </a:r>
                       <a:endParaRPr lang="en-US" sz="1400" dirty="0">
                         <a:solidFill>
                           <a:srgbClr val="008000"/>
@@ -7333,20 +8953,27 @@
                     <a:bodyPr/>
                     <a:lstStyle/>
                     <a:p>
-                      <a:endParaRPr lang="en-US" sz="1400" dirty="0">
-                        <a:solidFill>
-                          <a:srgbClr val="FF0000"/>
-                        </a:solidFill>
-                      </a:endParaRPr>
-                    </a:p>
-                  </a:txBody>
-                  <a:tcPr/>
-                </a:tc>
-                <a:tc>
-                  <a:txBody>
-                    <a:bodyPr/>
-                    <a:lstStyle/>
-                    <a:p>
+                      <a:r>
+                        <a:rPr lang="en-US" sz="1400" dirty="0" smtClean="0">
+                          <a:solidFill>
+                            <a:srgbClr val="FF0000"/>
+                          </a:solidFill>
+                        </a:rPr>
+                        <a:t>0.19</a:t>
+                      </a:r>
+                    </a:p>
+                  </a:txBody>
+                  <a:tcPr/>
+                </a:tc>
+                <a:tc>
+                  <a:txBody>
+                    <a:bodyPr/>
+                    <a:lstStyle/>
+                    <a:p>
+                      <a:r>
+                        <a:rPr lang="en-US" sz="1400" dirty="0" smtClean="0"/>
+                        <a:t>0.01</a:t>
+                      </a:r>
                       <a:endParaRPr lang="en-US" sz="1400" dirty="0"/>
                     </a:p>
                   </a:txBody>
@@ -7390,6 +9017,14 @@
                     <a:bodyPr/>
                     <a:lstStyle/>
                     <a:p>
+                      <a:r>
+                        <a:rPr lang="en-US" sz="1400" dirty="0" smtClean="0">
+                          <a:solidFill>
+                            <a:srgbClr val="008000"/>
+                          </a:solidFill>
+                        </a:rPr>
+                        <a:t>-</a:t>
+                      </a:r>
                       <a:endParaRPr lang="en-US" sz="1400" dirty="0">
                         <a:solidFill>
                           <a:srgbClr val="008000"/>
@@ -7404,6 +9039,14 @@
                     <a:bodyPr/>
                     <a:lstStyle/>
                     <a:p>
+                      <a:r>
+                        <a:rPr lang="en-US" sz="1400" dirty="0" smtClean="0">
+                          <a:solidFill>
+                            <a:srgbClr val="FF0000"/>
+                          </a:solidFill>
+                        </a:rPr>
+                        <a:t>-</a:t>
+                      </a:r>
                       <a:endParaRPr lang="en-US" sz="1400" dirty="0">
                         <a:solidFill>
                           <a:srgbClr val="FF0000"/>
@@ -7418,6 +9061,10 @@
                     <a:bodyPr/>
                     <a:lstStyle/>
                     <a:p>
+                      <a:r>
+                        <a:rPr lang="en-US" sz="1400" dirty="0" smtClean="0"/>
+                        <a:t>-</a:t>
+                      </a:r>
                       <a:endParaRPr lang="en-US" sz="1400" dirty="0"/>
                     </a:p>
                   </a:txBody>
@@ -7461,6 +9108,14 @@
                     <a:bodyPr/>
                     <a:lstStyle/>
                     <a:p>
+                      <a:r>
+                        <a:rPr lang="en-US" sz="1400" dirty="0" smtClean="0">
+                          <a:solidFill>
+                            <a:srgbClr val="008000"/>
+                          </a:solidFill>
+                        </a:rPr>
+                        <a:t>15.80</a:t>
+                      </a:r>
                       <a:endParaRPr lang="en-US" sz="1400" dirty="0">
                         <a:solidFill>
                           <a:srgbClr val="008000"/>
@@ -7475,6 +9130,14 @@
                     <a:bodyPr/>
                     <a:lstStyle/>
                     <a:p>
+                      <a:r>
+                        <a:rPr lang="en-US" sz="1400" dirty="0" smtClean="0">
+                          <a:solidFill>
+                            <a:srgbClr val="FF0000"/>
+                          </a:solidFill>
+                        </a:rPr>
+                        <a:t>-1.01</a:t>
+                      </a:r>
                       <a:endParaRPr lang="en-US" sz="1400" dirty="0">
                         <a:solidFill>
                           <a:srgbClr val="FF0000"/>
@@ -7489,6 +9152,10 @@
                     <a:bodyPr/>
                     <a:lstStyle/>
                     <a:p>
+                      <a:r>
+                        <a:rPr lang="en-US" sz="1400" dirty="0" smtClean="0"/>
+                        <a:t>0.03</a:t>
+                      </a:r>
                       <a:endParaRPr lang="en-US" sz="1400" dirty="0"/>
                     </a:p>
                   </a:txBody>
@@ -7950,7 +9617,7 @@
                     <a:lstStyle/>
                     <a:p>
                       <a:r>
-                        <a:rPr lang="en-US" sz="1400" smtClean="0"/>
+                        <a:rPr lang="en-US" sz="1400" dirty="0" smtClean="0"/>
                         <a:t>0.12</a:t>
                       </a:r>
                       <a:endParaRPr lang="en-US" sz="1400" dirty="0"/>

</xml_diff>